<commit_message>
Update Interoperability Technology in Healthcare.pptx
</commit_message>
<xml_diff>
--- a/Interoperability Technology in Healthcare.pptx
+++ b/Interoperability Technology in Healthcare.pptx
@@ -12,6 +12,13 @@
     <p:sldId id="260" r:id="rId6"/>
     <p:sldId id="261" r:id="rId7"/>
     <p:sldId id="263" r:id="rId8"/>
+    <p:sldId id="265" r:id="rId9"/>
+    <p:sldId id="267" r:id="rId10"/>
+    <p:sldId id="268" r:id="rId11"/>
+    <p:sldId id="270" r:id="rId12"/>
+    <p:sldId id="264" r:id="rId13"/>
+    <p:sldId id="266" r:id="rId14"/>
+    <p:sldId id="269" r:id="rId15"/>
   </p:sldIdLst>
   <p:sldSz cx="12192000" cy="6858000"/>
   <p:notesSz cx="6858000" cy="9144000"/>
@@ -3405,13 +3412,8 @@
           <a:p>
             <a:r>
               <a:rPr lang="en-IN" dirty="0"/>
-              <a:t>Stevens Institute of </a:t>
-            </a:r>
-            <a:r>
-              <a:rPr lang="en-IN" dirty="0" err="1"/>
-              <a:t>Techonlogy</a:t>
-            </a:r>
-            <a:endParaRPr lang="en-IN" dirty="0"/>
+              <a:t>Stevens Institute of Technology</a:t>
+            </a:r>
           </a:p>
         </p:txBody>
       </p:sp>
@@ -3419,6 +3421,633 @@
     <p:extLst>
       <p:ext uri="{BB962C8B-B14F-4D97-AF65-F5344CB8AC3E}">
         <p14:creationId xmlns:p14="http://schemas.microsoft.com/office/powerpoint/2010/main" val="2748689476"/>
+      </p:ext>
+    </p:extLst>
+  </p:cSld>
+  <p:clrMapOvr>
+    <a:masterClrMapping/>
+  </p:clrMapOvr>
+</p:sld>
+</file>
+
+<file path=ppt/slides/slide10.xml><?xml version="1.0" encoding="utf-8"?>
+<p:sld xmlns:a="http://schemas.openxmlformats.org/drawingml/2006/main" xmlns:r="http://schemas.openxmlformats.org/officeDocument/2006/relationships" xmlns:p="http://schemas.openxmlformats.org/presentationml/2006/main">
+  <p:cSld>
+    <p:spTree>
+      <p:nvGrpSpPr>
+        <p:cNvPr id="1" name=""/>
+        <p:cNvGrpSpPr/>
+        <p:nvPr/>
+      </p:nvGrpSpPr>
+      <p:grpSpPr>
+        <a:xfrm>
+          <a:off x="0" y="0"/>
+          <a:ext cx="0" cy="0"/>
+          <a:chOff x="0" y="0"/>
+          <a:chExt cx="0" cy="0"/>
+        </a:xfrm>
+      </p:grpSpPr>
+      <p:sp>
+        <p:nvSpPr>
+          <p:cNvPr id="5" name="Title 4">
+            <a:extLst>
+              <a:ext uri="{FF2B5EF4-FFF2-40B4-BE49-F238E27FC236}">
+                <a16:creationId xmlns:a16="http://schemas.microsoft.com/office/drawing/2014/main" id="{87285F25-4FC1-C486-7213-F3A3A6704AFC}"/>
+              </a:ext>
+            </a:extLst>
+          </p:cNvPr>
+          <p:cNvSpPr>
+            <a:spLocks noGrp="1"/>
+          </p:cNvSpPr>
+          <p:nvPr>
+            <p:ph type="title"/>
+          </p:nvPr>
+        </p:nvSpPr>
+        <p:spPr>
+          <a:xfrm>
+            <a:off x="838200" y="1720882"/>
+            <a:ext cx="10515600" cy="1325563"/>
+          </a:xfrm>
+        </p:spPr>
+        <p:txBody>
+          <a:bodyPr/>
+          <a:lstStyle/>
+          <a:p>
+            <a:pPr algn="ctr"/>
+            <a:r>
+              <a:rPr lang="en-IN" dirty="0"/>
+              <a:t>Time for Demo</a:t>
+            </a:r>
+          </a:p>
+        </p:txBody>
+      </p:sp>
+    </p:spTree>
+    <p:extLst>
+      <p:ext uri="{BB962C8B-B14F-4D97-AF65-F5344CB8AC3E}">
+        <p14:creationId xmlns:p14="http://schemas.microsoft.com/office/powerpoint/2010/main" val="3398037099"/>
+      </p:ext>
+    </p:extLst>
+  </p:cSld>
+  <p:clrMapOvr>
+    <a:masterClrMapping/>
+  </p:clrMapOvr>
+</p:sld>
+</file>
+
+<file path=ppt/slides/slide11.xml><?xml version="1.0" encoding="utf-8"?>
+<p:sld xmlns:a="http://schemas.openxmlformats.org/drawingml/2006/main" xmlns:r="http://schemas.openxmlformats.org/officeDocument/2006/relationships" xmlns:p="http://schemas.openxmlformats.org/presentationml/2006/main">
+  <p:cSld>
+    <p:spTree>
+      <p:nvGrpSpPr>
+        <p:cNvPr id="1" name=""/>
+        <p:cNvGrpSpPr/>
+        <p:nvPr/>
+      </p:nvGrpSpPr>
+      <p:grpSpPr>
+        <a:xfrm>
+          <a:off x="0" y="0"/>
+          <a:ext cx="0" cy="0"/>
+          <a:chOff x="0" y="0"/>
+          <a:chExt cx="0" cy="0"/>
+        </a:xfrm>
+      </p:grpSpPr>
+      <p:sp>
+        <p:nvSpPr>
+          <p:cNvPr id="2" name="Title 1">
+            <a:extLst>
+              <a:ext uri="{FF2B5EF4-FFF2-40B4-BE49-F238E27FC236}">
+                <a16:creationId xmlns:a16="http://schemas.microsoft.com/office/drawing/2014/main" id="{F1647005-3D0F-02E2-DB5C-A333822DE9A8}"/>
+              </a:ext>
+            </a:extLst>
+          </p:cNvPr>
+          <p:cNvSpPr>
+            <a:spLocks noGrp="1"/>
+          </p:cNvSpPr>
+          <p:nvPr>
+            <p:ph type="title"/>
+          </p:nvPr>
+        </p:nvSpPr>
+        <p:spPr/>
+        <p:txBody>
+          <a:bodyPr/>
+          <a:lstStyle/>
+          <a:p>
+            <a:r>
+              <a:rPr lang="en-IN" dirty="0"/>
+              <a:t>Scope for growth</a:t>
+            </a:r>
+          </a:p>
+        </p:txBody>
+      </p:sp>
+      <p:sp>
+        <p:nvSpPr>
+          <p:cNvPr id="3" name="Content Placeholder 2">
+            <a:extLst>
+              <a:ext uri="{FF2B5EF4-FFF2-40B4-BE49-F238E27FC236}">
+                <a16:creationId xmlns:a16="http://schemas.microsoft.com/office/drawing/2014/main" id="{58330B73-5C88-F839-5336-CC901856567A}"/>
+              </a:ext>
+            </a:extLst>
+          </p:cNvPr>
+          <p:cNvSpPr>
+            <a:spLocks noGrp="1"/>
+          </p:cNvSpPr>
+          <p:nvPr>
+            <p:ph idx="1"/>
+          </p:nvPr>
+        </p:nvSpPr>
+        <p:spPr>
+          <a:xfrm>
+            <a:off x="838200" y="1825625"/>
+            <a:ext cx="5524500" cy="4351338"/>
+          </a:xfrm>
+        </p:spPr>
+        <p:txBody>
+          <a:bodyPr anchor="ctr"/>
+          <a:lstStyle/>
+          <a:p>
+            <a:pPr>
+              <a:lnSpc>
+                <a:spcPct val="150000"/>
+              </a:lnSpc>
+            </a:pPr>
+            <a:r>
+              <a:rPr lang="en-IN" dirty="0"/>
+              <a:t>Sophisticated Architecture</a:t>
+            </a:r>
+          </a:p>
+          <a:p>
+            <a:pPr>
+              <a:lnSpc>
+                <a:spcPct val="150000"/>
+              </a:lnSpc>
+            </a:pPr>
+            <a:r>
+              <a:rPr lang="en-IN" dirty="0"/>
+              <a:t>Distributed Systems</a:t>
+            </a:r>
+          </a:p>
+          <a:p>
+            <a:pPr>
+              <a:lnSpc>
+                <a:spcPct val="150000"/>
+              </a:lnSpc>
+            </a:pPr>
+            <a:r>
+              <a:rPr lang="en-IN" dirty="0"/>
+              <a:t>Data handling and translators</a:t>
+            </a:r>
+          </a:p>
+          <a:p>
+            <a:pPr>
+              <a:lnSpc>
+                <a:spcPct val="150000"/>
+              </a:lnSpc>
+            </a:pPr>
+            <a:r>
+              <a:rPr lang="en-IN" dirty="0"/>
+              <a:t>Proper error handling and analysis</a:t>
+            </a:r>
+          </a:p>
+          <a:p>
+            <a:pPr>
+              <a:lnSpc>
+                <a:spcPct val="150000"/>
+              </a:lnSpc>
+            </a:pPr>
+            <a:r>
+              <a:rPr lang="en-IN" dirty="0"/>
+              <a:t>Take it to the clouds</a:t>
+            </a:r>
+          </a:p>
+        </p:txBody>
+      </p:sp>
+      <p:pic>
+        <p:nvPicPr>
+          <p:cNvPr id="8198" name="Picture 6">
+            <a:extLst>
+              <a:ext uri="{FF2B5EF4-FFF2-40B4-BE49-F238E27FC236}">
+                <a16:creationId xmlns:a16="http://schemas.microsoft.com/office/drawing/2014/main" id="{53D4F424-F343-F981-F27A-569A2B118FC7}"/>
+              </a:ext>
+            </a:extLst>
+          </p:cNvPr>
+          <p:cNvPicPr>
+            <a:picLocks noChangeAspect="1" noChangeArrowheads="1"/>
+          </p:cNvPicPr>
+          <p:nvPr/>
+        </p:nvPicPr>
+        <p:blipFill>
+          <a:blip r:embed="rId2">
+            <a:extLst>
+              <a:ext uri="{28A0092B-C50C-407E-A947-70E740481C1C}">
+                <a14:useLocalDpi xmlns:a14="http://schemas.microsoft.com/office/drawing/2010/main" val="0"/>
+              </a:ext>
+            </a:extLst>
+          </a:blip>
+          <a:srcRect/>
+          <a:stretch>
+            <a:fillRect/>
+          </a:stretch>
+        </p:blipFill>
+        <p:spPr bwMode="auto">
+          <a:xfrm>
+            <a:off x="7134227" y="1395413"/>
+            <a:ext cx="4410075" cy="4781550"/>
+          </a:xfrm>
+          <a:prstGeom prst="rect">
+            <a:avLst/>
+          </a:prstGeom>
+          <a:noFill/>
+          <a:extLst>
+            <a:ext uri="{909E8E84-426E-40DD-AFC4-6F175D3DCCD1}">
+              <a14:hiddenFill xmlns:a14="http://schemas.microsoft.com/office/drawing/2010/main">
+                <a:solidFill>
+                  <a:srgbClr val="FFFFFF"/>
+                </a:solidFill>
+              </a14:hiddenFill>
+            </a:ext>
+          </a:extLst>
+        </p:spPr>
+      </p:pic>
+    </p:spTree>
+    <p:extLst>
+      <p:ext uri="{BB962C8B-B14F-4D97-AF65-F5344CB8AC3E}">
+        <p14:creationId xmlns:p14="http://schemas.microsoft.com/office/powerpoint/2010/main" val="3490322273"/>
+      </p:ext>
+    </p:extLst>
+  </p:cSld>
+  <p:clrMapOvr>
+    <a:masterClrMapping/>
+  </p:clrMapOvr>
+</p:sld>
+</file>
+
+<file path=ppt/slides/slide12.xml><?xml version="1.0" encoding="utf-8"?>
+<p:sld xmlns:a="http://schemas.openxmlformats.org/drawingml/2006/main" xmlns:r="http://schemas.openxmlformats.org/officeDocument/2006/relationships" xmlns:p="http://schemas.openxmlformats.org/presentationml/2006/main">
+  <p:cSld>
+    <p:spTree>
+      <p:nvGrpSpPr>
+        <p:cNvPr id="1" name=""/>
+        <p:cNvGrpSpPr/>
+        <p:nvPr/>
+      </p:nvGrpSpPr>
+      <p:grpSpPr>
+        <a:xfrm>
+          <a:off x="0" y="0"/>
+          <a:ext cx="0" cy="0"/>
+          <a:chOff x="0" y="0"/>
+          <a:chExt cx="0" cy="0"/>
+        </a:xfrm>
+      </p:grpSpPr>
+      <p:sp>
+        <p:nvSpPr>
+          <p:cNvPr id="2" name="Title 1">
+            <a:extLst>
+              <a:ext uri="{FF2B5EF4-FFF2-40B4-BE49-F238E27FC236}">
+                <a16:creationId xmlns:a16="http://schemas.microsoft.com/office/drawing/2014/main" id="{AD690931-C211-122F-3139-D8AF6C00931D}"/>
+              </a:ext>
+            </a:extLst>
+          </p:cNvPr>
+          <p:cNvSpPr>
+            <a:spLocks noGrp="1"/>
+          </p:cNvSpPr>
+          <p:nvPr>
+            <p:ph type="title"/>
+          </p:nvPr>
+        </p:nvSpPr>
+        <p:spPr/>
+        <p:txBody>
+          <a:bodyPr/>
+          <a:lstStyle/>
+          <a:p>
+            <a:r>
+              <a:rPr lang="en-IN" dirty="0"/>
+              <a:t>Cloud APIs - Azure</a:t>
+            </a:r>
+          </a:p>
+        </p:txBody>
+      </p:sp>
+      <p:sp>
+        <p:nvSpPr>
+          <p:cNvPr id="3" name="Content Placeholder 2">
+            <a:extLst>
+              <a:ext uri="{FF2B5EF4-FFF2-40B4-BE49-F238E27FC236}">
+                <a16:creationId xmlns:a16="http://schemas.microsoft.com/office/drawing/2014/main" id="{A9FBDF01-EF4A-3AD7-DB95-04CBF977A0B8}"/>
+              </a:ext>
+            </a:extLst>
+          </p:cNvPr>
+          <p:cNvSpPr>
+            <a:spLocks noGrp="1"/>
+          </p:cNvSpPr>
+          <p:nvPr>
+            <p:ph idx="1"/>
+          </p:nvPr>
+        </p:nvSpPr>
+        <p:spPr>
+          <a:xfrm>
+            <a:off x="838200" y="5619749"/>
+            <a:ext cx="9772650" cy="557213"/>
+          </a:xfrm>
+        </p:spPr>
+        <p:txBody>
+          <a:bodyPr>
+            <a:normAutofit/>
+          </a:bodyPr>
+          <a:lstStyle/>
+          <a:p>
+            <a:pPr marL="0" indent="0">
+              <a:buNone/>
+            </a:pPr>
+            <a:r>
+              <a:rPr lang="en-IN" sz="2000" dirty="0">
+                <a:hlinkClick r:id="rId2"/>
+              </a:rPr>
+              <a:t>https://learn.microsoft.com/en-us/azure/healthcare-apis/azure-api-for-fhir/overview</a:t>
+            </a:r>
+            <a:r>
+              <a:rPr lang="en-IN" sz="2000" dirty="0"/>
+              <a:t> </a:t>
+            </a:r>
+          </a:p>
+        </p:txBody>
+      </p:sp>
+      <p:pic>
+        <p:nvPicPr>
+          <p:cNvPr id="4098" name="Picture 2" descr="Microsoft Releases Azure API for Fast Healthcare Interoperability Resource ( FHIR) as GA">
+            <a:extLst>
+              <a:ext uri="{FF2B5EF4-FFF2-40B4-BE49-F238E27FC236}">
+                <a16:creationId xmlns:a16="http://schemas.microsoft.com/office/drawing/2014/main" id="{089704D9-7FC6-CA6D-A686-E984AB808C6E}"/>
+              </a:ext>
+            </a:extLst>
+          </p:cNvPr>
+          <p:cNvPicPr>
+            <a:picLocks noChangeAspect="1" noChangeArrowheads="1"/>
+          </p:cNvPicPr>
+          <p:nvPr/>
+        </p:nvPicPr>
+        <p:blipFill>
+          <a:blip r:embed="rId3">
+            <a:extLst>
+              <a:ext uri="{28A0092B-C50C-407E-A947-70E740481C1C}">
+                <a14:useLocalDpi xmlns:a14="http://schemas.microsoft.com/office/drawing/2010/main" val="0"/>
+              </a:ext>
+            </a:extLst>
+          </a:blip>
+          <a:srcRect/>
+          <a:stretch>
+            <a:fillRect/>
+          </a:stretch>
+        </p:blipFill>
+        <p:spPr bwMode="auto">
+          <a:xfrm>
+            <a:off x="2543175" y="1575610"/>
+            <a:ext cx="7105650" cy="3706780"/>
+          </a:xfrm>
+          <a:prstGeom prst="rect">
+            <a:avLst/>
+          </a:prstGeom>
+          <a:noFill/>
+          <a:extLst>
+            <a:ext uri="{909E8E84-426E-40DD-AFC4-6F175D3DCCD1}">
+              <a14:hiddenFill xmlns:a14="http://schemas.microsoft.com/office/drawing/2010/main">
+                <a:solidFill>
+                  <a:srgbClr val="FFFFFF"/>
+                </a:solidFill>
+              </a14:hiddenFill>
+            </a:ext>
+          </a:extLst>
+        </p:spPr>
+      </p:pic>
+    </p:spTree>
+    <p:extLst>
+      <p:ext uri="{BB962C8B-B14F-4D97-AF65-F5344CB8AC3E}">
+        <p14:creationId xmlns:p14="http://schemas.microsoft.com/office/powerpoint/2010/main" val="3472689546"/>
+      </p:ext>
+    </p:extLst>
+  </p:cSld>
+  <p:clrMapOvr>
+    <a:masterClrMapping/>
+  </p:clrMapOvr>
+</p:sld>
+</file>
+
+<file path=ppt/slides/slide13.xml><?xml version="1.0" encoding="utf-8"?>
+<p:sld xmlns:a="http://schemas.openxmlformats.org/drawingml/2006/main" xmlns:r="http://schemas.openxmlformats.org/officeDocument/2006/relationships" xmlns:p="http://schemas.openxmlformats.org/presentationml/2006/main">
+  <p:cSld>
+    <p:spTree>
+      <p:nvGrpSpPr>
+        <p:cNvPr id="1" name=""/>
+        <p:cNvGrpSpPr/>
+        <p:nvPr/>
+      </p:nvGrpSpPr>
+      <p:grpSpPr>
+        <a:xfrm>
+          <a:off x="0" y="0"/>
+          <a:ext cx="0" cy="0"/>
+          <a:chOff x="0" y="0"/>
+          <a:chExt cx="0" cy="0"/>
+        </a:xfrm>
+      </p:grpSpPr>
+      <p:sp>
+        <p:nvSpPr>
+          <p:cNvPr id="2" name="Title 1">
+            <a:extLst>
+              <a:ext uri="{FF2B5EF4-FFF2-40B4-BE49-F238E27FC236}">
+                <a16:creationId xmlns:a16="http://schemas.microsoft.com/office/drawing/2014/main" id="{D72591A6-7785-3D62-9EC6-980EB6D2F034}"/>
+              </a:ext>
+            </a:extLst>
+          </p:cNvPr>
+          <p:cNvSpPr>
+            <a:spLocks noGrp="1"/>
+          </p:cNvSpPr>
+          <p:nvPr>
+            <p:ph type="title"/>
+          </p:nvPr>
+        </p:nvSpPr>
+        <p:spPr/>
+        <p:txBody>
+          <a:bodyPr/>
+          <a:lstStyle/>
+          <a:p>
+            <a:r>
+              <a:rPr lang="en-IN" dirty="0"/>
+              <a:t>Cloud APIs - Google</a:t>
+            </a:r>
+          </a:p>
+        </p:txBody>
+      </p:sp>
+      <p:sp>
+        <p:nvSpPr>
+          <p:cNvPr id="3" name="Content Placeholder 2">
+            <a:extLst>
+              <a:ext uri="{FF2B5EF4-FFF2-40B4-BE49-F238E27FC236}">
+                <a16:creationId xmlns:a16="http://schemas.microsoft.com/office/drawing/2014/main" id="{6292B2B9-EB79-777E-F30B-AE56E1C3C9ED}"/>
+              </a:ext>
+            </a:extLst>
+          </p:cNvPr>
+          <p:cNvSpPr>
+            <a:spLocks noGrp="1"/>
+          </p:cNvSpPr>
+          <p:nvPr>
+            <p:ph idx="1"/>
+          </p:nvPr>
+        </p:nvSpPr>
+        <p:spPr>
+          <a:xfrm>
+            <a:off x="838200" y="5467349"/>
+            <a:ext cx="10515600" cy="709613"/>
+          </a:xfrm>
+        </p:spPr>
+        <p:txBody>
+          <a:bodyPr>
+            <a:normAutofit/>
+          </a:bodyPr>
+          <a:lstStyle/>
+          <a:p>
+            <a:pPr marL="0" indent="0">
+              <a:buNone/>
+            </a:pPr>
+            <a:r>
+              <a:rPr lang="en-IN" sz="2000" dirty="0">
+                <a:hlinkClick r:id="rId2"/>
+              </a:rPr>
+              <a:t>https://cloud.google.com/healthcare-api/docs/concepts/fhir</a:t>
+            </a:r>
+            <a:r>
+              <a:rPr lang="en-IN" sz="2000" dirty="0"/>
+              <a:t> </a:t>
+            </a:r>
+          </a:p>
+        </p:txBody>
+      </p:sp>
+      <p:pic>
+        <p:nvPicPr>
+          <p:cNvPr id="5122" name="Picture 2" descr="Getting to know the Google Cloud Healthcare API: Part 1 | Google Cloud Blog">
+            <a:extLst>
+              <a:ext uri="{FF2B5EF4-FFF2-40B4-BE49-F238E27FC236}">
+                <a16:creationId xmlns:a16="http://schemas.microsoft.com/office/drawing/2014/main" id="{B54AAFC2-8143-3FAC-0062-DBBFDCB292BC}"/>
+              </a:ext>
+            </a:extLst>
+          </p:cNvPr>
+          <p:cNvPicPr>
+            <a:picLocks noChangeAspect="1" noChangeArrowheads="1"/>
+          </p:cNvPicPr>
+          <p:nvPr/>
+        </p:nvPicPr>
+        <p:blipFill>
+          <a:blip r:embed="rId3">
+            <a:extLst>
+              <a:ext uri="{28A0092B-C50C-407E-A947-70E740481C1C}">
+                <a14:useLocalDpi xmlns:a14="http://schemas.microsoft.com/office/drawing/2010/main" val="0"/>
+              </a:ext>
+            </a:extLst>
+          </a:blip>
+          <a:srcRect/>
+          <a:stretch>
+            <a:fillRect/>
+          </a:stretch>
+        </p:blipFill>
+        <p:spPr bwMode="auto">
+          <a:xfrm>
+            <a:off x="2381250" y="1629265"/>
+            <a:ext cx="7429500" cy="3595878"/>
+          </a:xfrm>
+          <a:prstGeom prst="rect">
+            <a:avLst/>
+          </a:prstGeom>
+          <a:noFill/>
+          <a:extLst>
+            <a:ext uri="{909E8E84-426E-40DD-AFC4-6F175D3DCCD1}">
+              <a14:hiddenFill xmlns:a14="http://schemas.microsoft.com/office/drawing/2010/main">
+                <a:solidFill>
+                  <a:srgbClr val="FFFFFF"/>
+                </a:solidFill>
+              </a14:hiddenFill>
+            </a:ext>
+          </a:extLst>
+        </p:spPr>
+      </p:pic>
+    </p:spTree>
+    <p:extLst>
+      <p:ext uri="{BB962C8B-B14F-4D97-AF65-F5344CB8AC3E}">
+        <p14:creationId xmlns:p14="http://schemas.microsoft.com/office/powerpoint/2010/main" val="1009046086"/>
+      </p:ext>
+    </p:extLst>
+  </p:cSld>
+  <p:clrMapOvr>
+    <a:masterClrMapping/>
+  </p:clrMapOvr>
+</p:sld>
+</file>
+
+<file path=ppt/slides/slide14.xml><?xml version="1.0" encoding="utf-8"?>
+<p:sld xmlns:a="http://schemas.openxmlformats.org/drawingml/2006/main" xmlns:r="http://schemas.openxmlformats.org/officeDocument/2006/relationships" xmlns:p="http://schemas.openxmlformats.org/presentationml/2006/main">
+  <p:cSld>
+    <p:spTree>
+      <p:nvGrpSpPr>
+        <p:cNvPr id="1" name=""/>
+        <p:cNvGrpSpPr/>
+        <p:nvPr/>
+      </p:nvGrpSpPr>
+      <p:grpSpPr>
+        <a:xfrm>
+          <a:off x="0" y="0"/>
+          <a:ext cx="0" cy="0"/>
+          <a:chOff x="0" y="0"/>
+          <a:chExt cx="0" cy="0"/>
+        </a:xfrm>
+      </p:grpSpPr>
+      <p:sp>
+        <p:nvSpPr>
+          <p:cNvPr id="4" name="Rectangle 3">
+            <a:extLst>
+              <a:ext uri="{FF2B5EF4-FFF2-40B4-BE49-F238E27FC236}">
+                <a16:creationId xmlns:a16="http://schemas.microsoft.com/office/drawing/2014/main" id="{B23C356F-8A8B-CAF5-969C-EE79B5B8CD08}"/>
+              </a:ext>
+            </a:extLst>
+          </p:cNvPr>
+          <p:cNvSpPr/>
+          <p:nvPr/>
+        </p:nvSpPr>
+        <p:spPr>
+          <a:xfrm>
+            <a:off x="4551411" y="2967335"/>
+            <a:ext cx="3089179" cy="923330"/>
+          </a:xfrm>
+          <a:prstGeom prst="rect">
+            <a:avLst/>
+          </a:prstGeom>
+          <a:noFill/>
+        </p:spPr>
+        <p:txBody>
+          <a:bodyPr wrap="none" lIns="91440" tIns="45720" rIns="91440" bIns="45720">
+            <a:spAutoFit/>
+          </a:bodyPr>
+          <a:lstStyle/>
+          <a:p>
+            <a:pPr algn="ctr"/>
+            <a:r>
+              <a:rPr lang="en-US" sz="5400" b="0" cap="none" spc="0" dirty="0">
+                <a:ln w="0"/>
+                <a:solidFill>
+                  <a:schemeClr val="accent1"/>
+                </a:solidFill>
+                <a:effectLst>
+                  <a:outerShdw blurRad="38100" dist="25400" dir="5400000" algn="ctr" rotWithShape="0">
+                    <a:srgbClr val="6E747A">
+                      <a:alpha val="43000"/>
+                    </a:srgbClr>
+                  </a:outerShdw>
+                </a:effectLst>
+              </a:rPr>
+              <a:t>Thank you</a:t>
+            </a:r>
+          </a:p>
+        </p:txBody>
+      </p:sp>
+    </p:spTree>
+    <p:extLst>
+      <p:ext uri="{BB962C8B-B14F-4D97-AF65-F5344CB8AC3E}">
+        <p14:creationId xmlns:p14="http://schemas.microsoft.com/office/powerpoint/2010/main" val="2683176878"/>
       </p:ext>
     </p:extLst>
   </p:cSld>
@@ -3523,7 +4152,7 @@
           <a:p>
             <a:r>
               <a:rPr lang="en-IN" dirty="0"/>
-              <a:t>TEFA+QHINs</a:t>
+              <a:t>TEFCA+QHINs</a:t>
             </a:r>
           </a:p>
         </p:txBody>
@@ -3632,7 +4261,7 @@
           <a:p>
             <a:r>
               <a:rPr lang="en-IN" dirty="0"/>
-              <a:t>Architecture and working principles</a:t>
+              <a:t>Components and working principles</a:t>
             </a:r>
           </a:p>
           <a:p>
@@ -4218,8 +4847,8 @@
         </p:nvSpPr>
         <p:spPr>
           <a:xfrm>
-            <a:off x="838200" y="1825625"/>
-            <a:ext cx="3957735" cy="4351338"/>
+            <a:off x="838201" y="1825625"/>
+            <a:ext cx="2884713" cy="4351338"/>
           </a:xfrm>
         </p:spPr>
         <p:txBody>
@@ -4259,10 +4888,142 @@
               <a:t>Serialization</a:t>
             </a:r>
           </a:p>
+        </p:txBody>
+      </p:sp>
+      <p:pic>
+        <p:nvPicPr>
+          <p:cNvPr id="2056" name="Picture 8" descr="Clinical data exchange with HL7 FHIR &amp; integration with Red Hat Fuse  (Apache Camel)">
+            <a:extLst>
+              <a:ext uri="{FF2B5EF4-FFF2-40B4-BE49-F238E27FC236}">
+                <a16:creationId xmlns:a16="http://schemas.microsoft.com/office/drawing/2014/main" id="{5BE8E597-3CA5-49AE-B163-78666A96843C}"/>
+              </a:ext>
+            </a:extLst>
+          </p:cNvPr>
+          <p:cNvPicPr>
+            <a:picLocks noChangeAspect="1" noChangeArrowheads="1"/>
+          </p:cNvPicPr>
+          <p:nvPr/>
+        </p:nvPicPr>
+        <p:blipFill>
+          <a:blip r:embed="rId2">
+            <a:extLst>
+              <a:ext uri="{28A0092B-C50C-407E-A947-70E740481C1C}">
+                <a14:useLocalDpi xmlns:a14="http://schemas.microsoft.com/office/drawing/2010/main" val="0"/>
+              </a:ext>
+            </a:extLst>
+          </a:blip>
+          <a:srcRect/>
+          <a:stretch>
+            <a:fillRect/>
+          </a:stretch>
+        </p:blipFill>
+        <p:spPr bwMode="auto">
+          <a:xfrm>
+            <a:off x="3626039" y="2664030"/>
+            <a:ext cx="7727760" cy="2674528"/>
+          </a:xfrm>
+          <a:prstGeom prst="rect">
+            <a:avLst/>
+          </a:prstGeom>
+          <a:noFill/>
+          <a:extLst>
+            <a:ext uri="{909E8E84-426E-40DD-AFC4-6F175D3DCCD1}">
+              <a14:hiddenFill xmlns:a14="http://schemas.microsoft.com/office/drawing/2010/main">
+                <a:solidFill>
+                  <a:srgbClr val="FFFFFF"/>
+                </a:solidFill>
+              </a14:hiddenFill>
+            </a:ext>
+          </a:extLst>
+        </p:spPr>
+      </p:pic>
+    </p:spTree>
+    <p:extLst>
+      <p:ext uri="{BB962C8B-B14F-4D97-AF65-F5344CB8AC3E}">
+        <p14:creationId xmlns:p14="http://schemas.microsoft.com/office/powerpoint/2010/main" val="2291736063"/>
+      </p:ext>
+    </p:extLst>
+  </p:cSld>
+  <p:clrMapOvr>
+    <a:masterClrMapping/>
+  </p:clrMapOvr>
+</p:sld>
+</file>
+
+<file path=ppt/slides/slide8.xml><?xml version="1.0" encoding="utf-8"?>
+<p:sld xmlns:a="http://schemas.openxmlformats.org/drawingml/2006/main" xmlns:r="http://schemas.openxmlformats.org/officeDocument/2006/relationships" xmlns:p="http://schemas.openxmlformats.org/presentationml/2006/main">
+  <p:cSld>
+    <p:spTree>
+      <p:nvGrpSpPr>
+        <p:cNvPr id="1" name=""/>
+        <p:cNvGrpSpPr/>
+        <p:nvPr/>
+      </p:nvGrpSpPr>
+      <p:grpSpPr>
+        <a:xfrm>
+          <a:off x="0" y="0"/>
+          <a:ext cx="0" cy="0"/>
+          <a:chOff x="0" y="0"/>
+          <a:chExt cx="0" cy="0"/>
+        </a:xfrm>
+      </p:grpSpPr>
+      <p:sp>
+        <p:nvSpPr>
+          <p:cNvPr id="2" name="Title 1">
+            <a:extLst>
+              <a:ext uri="{FF2B5EF4-FFF2-40B4-BE49-F238E27FC236}">
+                <a16:creationId xmlns:a16="http://schemas.microsoft.com/office/drawing/2014/main" id="{CF8ED38E-4135-BB9E-28C6-BA4A4325BF0B}"/>
+              </a:ext>
+            </a:extLst>
+          </p:cNvPr>
+          <p:cNvSpPr>
+            <a:spLocks noGrp="1"/>
+          </p:cNvSpPr>
+          <p:nvPr>
+            <p:ph type="title"/>
+          </p:nvPr>
+        </p:nvSpPr>
+        <p:spPr/>
+        <p:txBody>
+          <a:bodyPr/>
+          <a:lstStyle/>
           <a:p>
             <a:r>
               <a:rPr lang="en-IN" dirty="0"/>
-              <a:t>Exchange model</a:t>
+              <a:t>Fast Healthcare Interoperability Resource (FHIR)</a:t>
+            </a:r>
+          </a:p>
+        </p:txBody>
+      </p:sp>
+      <p:sp>
+        <p:nvSpPr>
+          <p:cNvPr id="3" name="Content Placeholder 2">
+            <a:extLst>
+              <a:ext uri="{FF2B5EF4-FFF2-40B4-BE49-F238E27FC236}">
+                <a16:creationId xmlns:a16="http://schemas.microsoft.com/office/drawing/2014/main" id="{921270A5-705F-FC0E-8D57-CB8FD9BE5ACB}"/>
+              </a:ext>
+            </a:extLst>
+          </p:cNvPr>
+          <p:cNvSpPr>
+            <a:spLocks noGrp="1"/>
+          </p:cNvSpPr>
+          <p:nvPr>
+            <p:ph idx="1"/>
+          </p:nvPr>
+        </p:nvSpPr>
+        <p:spPr>
+          <a:xfrm>
+            <a:off x="671803" y="1825625"/>
+            <a:ext cx="3517641" cy="4351338"/>
+          </a:xfrm>
+        </p:spPr>
+        <p:txBody>
+          <a:bodyPr anchor="ctr"/>
+          <a:lstStyle/>
+          <a:p>
+            <a:r>
+              <a:rPr lang="en-IN" dirty="0"/>
+              <a:t>Exchange framework</a:t>
             </a:r>
           </a:p>
           <a:p>
@@ -4293,14 +5054,17 @@
               <a:t>Subscriptions</a:t>
             </a:r>
           </a:p>
+          <a:p>
+            <a:endParaRPr lang="en-IN" dirty="0"/>
+          </a:p>
         </p:txBody>
       </p:sp>
       <p:pic>
         <p:nvPicPr>
-          <p:cNvPr id="5" name="Picture 4">
-            <a:extLst>
-              <a:ext uri="{FF2B5EF4-FFF2-40B4-BE49-F238E27FC236}">
-                <a16:creationId xmlns:a16="http://schemas.microsoft.com/office/drawing/2014/main" id="{BBD8B12F-9C27-E7A9-8D8B-D0433CEBF65D}"/>
+          <p:cNvPr id="4" name="Picture 3">
+            <a:extLst>
+              <a:ext uri="{FF2B5EF4-FFF2-40B4-BE49-F238E27FC236}">
+                <a16:creationId xmlns:a16="http://schemas.microsoft.com/office/drawing/2014/main" id="{83BEB648-7436-4F44-35A1-D6E21CF2B978}"/>
               </a:ext>
             </a:extLst>
           </p:cNvPr>
@@ -4317,8 +5081,8 @@
         </p:blipFill>
         <p:spPr>
           <a:xfrm>
-            <a:off x="4795935" y="3429000"/>
-            <a:ext cx="6749636" cy="2856170"/>
+            <a:off x="4426598" y="2107662"/>
+            <a:ext cx="6927202" cy="2642676"/>
           </a:xfrm>
           <a:prstGeom prst="rect">
             <a:avLst/>
@@ -4328,7 +5092,237 @@
     </p:spTree>
     <p:extLst>
       <p:ext uri="{BB962C8B-B14F-4D97-AF65-F5344CB8AC3E}">
-        <p14:creationId xmlns:p14="http://schemas.microsoft.com/office/powerpoint/2010/main" val="2291736063"/>
+        <p14:creationId xmlns:p14="http://schemas.microsoft.com/office/powerpoint/2010/main" val="776114652"/>
+      </p:ext>
+    </p:extLst>
+  </p:cSld>
+  <p:clrMapOvr>
+    <a:masterClrMapping/>
+  </p:clrMapOvr>
+</p:sld>
+</file>
+
+<file path=ppt/slides/slide9.xml><?xml version="1.0" encoding="utf-8"?>
+<p:sld xmlns:a="http://schemas.openxmlformats.org/drawingml/2006/main" xmlns:r="http://schemas.openxmlformats.org/officeDocument/2006/relationships" xmlns:p="http://schemas.openxmlformats.org/presentationml/2006/main">
+  <p:cSld>
+    <p:spTree>
+      <p:nvGrpSpPr>
+        <p:cNvPr id="1" name=""/>
+        <p:cNvGrpSpPr/>
+        <p:nvPr/>
+      </p:nvGrpSpPr>
+      <p:grpSpPr>
+        <a:xfrm>
+          <a:off x="0" y="0"/>
+          <a:ext cx="0" cy="0"/>
+          <a:chOff x="0" y="0"/>
+          <a:chExt cx="0" cy="0"/>
+        </a:xfrm>
+      </p:grpSpPr>
+      <p:sp>
+        <p:nvSpPr>
+          <p:cNvPr id="2" name="Title 1">
+            <a:extLst>
+              <a:ext uri="{FF2B5EF4-FFF2-40B4-BE49-F238E27FC236}">
+                <a16:creationId xmlns:a16="http://schemas.microsoft.com/office/drawing/2014/main" id="{C58E2D47-2E0E-4EE2-CC55-C1D36741A214}"/>
+              </a:ext>
+            </a:extLst>
+          </p:cNvPr>
+          <p:cNvSpPr>
+            <a:spLocks noGrp="1"/>
+          </p:cNvSpPr>
+          <p:nvPr>
+            <p:ph type="title"/>
+          </p:nvPr>
+        </p:nvSpPr>
+        <p:spPr/>
+        <p:txBody>
+          <a:bodyPr/>
+          <a:lstStyle/>
+          <a:p>
+            <a:r>
+              <a:rPr lang="en-IN" dirty="0"/>
+              <a:t>Open Source FHIR - HAPI</a:t>
+            </a:r>
+          </a:p>
+        </p:txBody>
+      </p:sp>
+      <p:sp>
+        <p:nvSpPr>
+          <p:cNvPr id="3" name="Content Placeholder 2">
+            <a:extLst>
+              <a:ext uri="{FF2B5EF4-FFF2-40B4-BE49-F238E27FC236}">
+                <a16:creationId xmlns:a16="http://schemas.microsoft.com/office/drawing/2014/main" id="{571F631F-6E5C-0D9C-7BC0-553A434D342E}"/>
+              </a:ext>
+            </a:extLst>
+          </p:cNvPr>
+          <p:cNvSpPr>
+            <a:spLocks noGrp="1"/>
+          </p:cNvSpPr>
+          <p:nvPr>
+            <p:ph idx="1"/>
+          </p:nvPr>
+        </p:nvSpPr>
+        <p:spPr>
+          <a:xfrm>
+            <a:off x="838200" y="1825625"/>
+            <a:ext cx="8548396" cy="4351338"/>
+          </a:xfrm>
+        </p:spPr>
+        <p:txBody>
+          <a:bodyPr anchor="ctr">
+            <a:normAutofit/>
+          </a:bodyPr>
+          <a:lstStyle/>
+          <a:p>
+            <a:pPr>
+              <a:lnSpc>
+                <a:spcPct val="150000"/>
+              </a:lnSpc>
+            </a:pPr>
+            <a:r>
+              <a:rPr lang="en-IN" sz="2000" dirty="0"/>
+              <a:t>HAPI – An open-source Java project which implements FHIR </a:t>
+            </a:r>
+            <a:r>
+              <a:rPr lang="en-IN" sz="2000" dirty="0" err="1"/>
+              <a:t>RestAPI</a:t>
+            </a:r>
+            <a:endParaRPr lang="en-IN" sz="2000" dirty="0"/>
+          </a:p>
+          <a:p>
+            <a:pPr>
+              <a:lnSpc>
+                <a:spcPct val="150000"/>
+              </a:lnSpc>
+            </a:pPr>
+            <a:r>
+              <a:rPr lang="en-IN" sz="2000" dirty="0"/>
+              <a:t>HAPI is a product of Smile CDR developed 18 years ago</a:t>
+            </a:r>
+          </a:p>
+          <a:p>
+            <a:pPr>
+              <a:lnSpc>
+                <a:spcPct val="150000"/>
+              </a:lnSpc>
+            </a:pPr>
+            <a:r>
+              <a:rPr lang="en-IN" sz="2000" dirty="0"/>
+              <a:t>Vast community and sophisticated documentation</a:t>
+            </a:r>
+          </a:p>
+          <a:p>
+            <a:pPr>
+              <a:lnSpc>
+                <a:spcPct val="150000"/>
+              </a:lnSpc>
+            </a:pPr>
+            <a:r>
+              <a:rPr lang="en-IN" sz="2000" dirty="0"/>
+              <a:t>Flexible modules and easy to implement</a:t>
+            </a:r>
+          </a:p>
+        </p:txBody>
+      </p:sp>
+      <p:pic>
+        <p:nvPicPr>
+          <p:cNvPr id="7170" name="Picture 2" descr="raccoon mascot">
+            <a:extLst>
+              <a:ext uri="{FF2B5EF4-FFF2-40B4-BE49-F238E27FC236}">
+                <a16:creationId xmlns:a16="http://schemas.microsoft.com/office/drawing/2014/main" id="{C6EE8601-36B4-ACED-FB73-30477AD22AE9}"/>
+              </a:ext>
+            </a:extLst>
+          </p:cNvPr>
+          <p:cNvPicPr>
+            <a:picLocks noChangeAspect="1" noChangeArrowheads="1"/>
+          </p:cNvPicPr>
+          <p:nvPr/>
+        </p:nvPicPr>
+        <p:blipFill>
+          <a:blip r:embed="rId2">
+            <a:extLst>
+              <a:ext uri="{28A0092B-C50C-407E-A947-70E740481C1C}">
+                <a14:useLocalDpi xmlns:a14="http://schemas.microsoft.com/office/drawing/2010/main" val="0"/>
+              </a:ext>
+            </a:extLst>
+          </a:blip>
+          <a:srcRect/>
+          <a:stretch>
+            <a:fillRect/>
+          </a:stretch>
+        </p:blipFill>
+        <p:spPr bwMode="auto">
+          <a:xfrm>
+            <a:off x="9164216" y="2687695"/>
+            <a:ext cx="2189584" cy="2411834"/>
+          </a:xfrm>
+          <a:prstGeom prst="rect">
+            <a:avLst/>
+          </a:prstGeom>
+          <a:noFill/>
+          <a:extLst>
+            <a:ext uri="{909E8E84-426E-40DD-AFC4-6F175D3DCCD1}">
+              <a14:hiddenFill xmlns:a14="http://schemas.microsoft.com/office/drawing/2010/main">
+                <a:solidFill>
+                  <a:srgbClr val="FFFFFF"/>
+                </a:solidFill>
+              </a14:hiddenFill>
+            </a:ext>
+          </a:extLst>
+        </p:spPr>
+      </p:pic>
+      <p:pic>
+        <p:nvPicPr>
+          <p:cNvPr id="7172" name="Picture 4" descr="HAPI FHIR logo">
+            <a:extLst>
+              <a:ext uri="{FF2B5EF4-FFF2-40B4-BE49-F238E27FC236}">
+                <a16:creationId xmlns:a16="http://schemas.microsoft.com/office/drawing/2014/main" id="{88E9AF01-0774-38FE-7442-874A26C0B6FD}"/>
+              </a:ext>
+            </a:extLst>
+          </p:cNvPr>
+          <p:cNvPicPr>
+            <a:picLocks noChangeAspect="1" noChangeArrowheads="1"/>
+          </p:cNvPicPr>
+          <p:nvPr/>
+        </p:nvPicPr>
+        <p:blipFill>
+          <a:blip r:embed="rId3">
+            <a:extLst>
+              <a:ext uri="{28A0092B-C50C-407E-A947-70E740481C1C}">
+                <a14:useLocalDpi xmlns:a14="http://schemas.microsoft.com/office/drawing/2010/main" val="0"/>
+              </a:ext>
+            </a:extLst>
+          </a:blip>
+          <a:srcRect/>
+          <a:stretch>
+            <a:fillRect/>
+          </a:stretch>
+        </p:blipFill>
+        <p:spPr bwMode="auto">
+          <a:xfrm>
+            <a:off x="8162925" y="5234466"/>
+            <a:ext cx="3810000" cy="523875"/>
+          </a:xfrm>
+          <a:prstGeom prst="rect">
+            <a:avLst/>
+          </a:prstGeom>
+          <a:noFill/>
+          <a:extLst>
+            <a:ext uri="{909E8E84-426E-40DD-AFC4-6F175D3DCCD1}">
+              <a14:hiddenFill xmlns:a14="http://schemas.microsoft.com/office/drawing/2010/main">
+                <a:solidFill>
+                  <a:srgbClr val="FFFFFF"/>
+                </a:solidFill>
+              </a14:hiddenFill>
+            </a:ext>
+          </a:extLst>
+        </p:spPr>
+      </p:pic>
+    </p:spTree>
+    <p:extLst>
+      <p:ext uri="{BB962C8B-B14F-4D97-AF65-F5344CB8AC3E}">
+        <p14:creationId xmlns:p14="http://schemas.microsoft.com/office/powerpoint/2010/main" val="2005629941"/>
       </p:ext>
     </p:extLst>
   </p:cSld>

</xml_diff>